<commit_message>
fixed omitted 'implements Shape' L1.3/26,28
</commit_message>
<xml_diff>
--- a/Slides/Lesson 1.3 Object-Oriented Principles.pptx
+++ b/Slides/Lesson 1.3 Object-Oriented Principles.pptx
@@ -270,7 +270,7 @@
           <a:p>
             <a:fld id="{7C7E5181-6CF5-45F7-A87A-E0E0B1FD7549}" type="datetimeFigureOut">
               <a:rPr lang="en-US" smtClean="0"/>
-              <a:t>1/13/22</a:t>
+              <a:t>1/19/2022</a:t>
             </a:fld>
             <a:endParaRPr lang="en-US"/>
           </a:p>
@@ -5066,7 +5066,7 @@
           <a:p>
             <a:fld id="{5D2A64DE-480B-420F-9649-4F8E696E08E0}" type="datetime1">
               <a:rPr lang="en-US" smtClean="0"/>
-              <a:t>1/13/22</a:t>
+              <a:t>1/19/2022</a:t>
             </a:fld>
             <a:endParaRPr lang="en-US"/>
           </a:p>
@@ -5390,7 +5390,7 @@
           <a:p>
             <a:fld id="{EA476A42-A091-4468-A075-64A31BE59948}" type="datetime1">
               <a:rPr lang="en-US" smtClean="0"/>
-              <a:t>1/13/22</a:t>
+              <a:t>1/19/2022</a:t>
             </a:fld>
             <a:endParaRPr lang="en-US"/>
           </a:p>
@@ -5588,7 +5588,7 @@
           <a:p>
             <a:fld id="{0D3616D0-8311-4107-9726-6B805E7D05BA}" type="datetime1">
               <a:rPr lang="en-US" smtClean="0"/>
-              <a:t>1/13/22</a:t>
+              <a:t>1/19/2022</a:t>
             </a:fld>
             <a:endParaRPr lang="en-US"/>
           </a:p>
@@ -5796,7 +5796,7 @@
           <a:p>
             <a:fld id="{3BC2557A-5C88-417A-A763-5AC779462A5F}" type="datetime1">
               <a:rPr lang="en-US" smtClean="0"/>
-              <a:t>1/13/22</a:t>
+              <a:t>1/19/2022</a:t>
             </a:fld>
             <a:endParaRPr lang="en-US"/>
           </a:p>
@@ -6320,7 +6320,7 @@
           <a:p>
             <a:fld id="{07C7BFD4-467E-4EDE-93EA-052F5B39A4E5}" type="datetime1">
               <a:rPr lang="en-US" smtClean="0"/>
-              <a:t>1/13/22</a:t>
+              <a:t>1/19/2022</a:t>
             </a:fld>
             <a:endParaRPr lang="en-US"/>
           </a:p>
@@ -6570,7 +6570,7 @@
           <a:p>
             <a:fld id="{07C7BFD4-467E-4EDE-93EA-052F5B39A4E5}" type="datetime1">
               <a:rPr lang="en-US" smtClean="0"/>
-              <a:t>1/13/22</a:t>
+              <a:t>1/19/2022</a:t>
             </a:fld>
             <a:endParaRPr lang="en-US"/>
           </a:p>
@@ -6883,7 +6883,7 @@
           <a:p>
             <a:fld id="{A533CBE2-D5BE-47AC-ADC2-9CDFC1D0CF90}" type="datetime1">
               <a:rPr lang="en-US" smtClean="0"/>
-              <a:t>1/13/22</a:t>
+              <a:t>1/19/2022</a:t>
             </a:fld>
             <a:endParaRPr lang="en-US"/>
           </a:p>
@@ -7184,7 +7184,7 @@
           <a:p>
             <a:fld id="{39B7EDB1-CE74-4951-85A2-0B01C2128E28}" type="datetime1">
               <a:rPr lang="en-US" smtClean="0"/>
-              <a:t>1/13/22</a:t>
+              <a:t>1/19/2022</a:t>
             </a:fld>
             <a:endParaRPr lang="en-US"/>
           </a:p>
@@ -7632,7 +7632,7 @@
           <a:p>
             <a:fld id="{2BC7EB92-A5C2-4807-A9DC-9EDE6CBFB241}" type="datetime1">
               <a:rPr lang="en-US" smtClean="0"/>
-              <a:t>1/13/22</a:t>
+              <a:t>1/19/2022</a:t>
             </a:fld>
             <a:endParaRPr lang="en-US"/>
           </a:p>
@@ -7778,7 +7778,7 @@
           <a:p>
             <a:fld id="{109E55A0-C911-4F03-82FC-7E5926047D46}" type="datetime1">
               <a:rPr lang="en-US" smtClean="0"/>
-              <a:t>1/13/22</a:t>
+              <a:t>1/19/2022</a:t>
             </a:fld>
             <a:endParaRPr lang="en-US"/>
           </a:p>
@@ -7927,7 +7927,7 @@
           <a:p>
             <a:fld id="{2B7B7EE0-7771-4CD5-9B2B-3550753A54A1}" type="datetime1">
               <a:rPr lang="en-US" smtClean="0"/>
-              <a:t>1/13/22</a:t>
+              <a:t>1/19/2022</a:t>
             </a:fld>
             <a:endParaRPr lang="en-US"/>
           </a:p>
@@ -8238,7 +8238,7 @@
           <a:p>
             <a:fld id="{F8B318B3-0E87-4416-A9B8-D891968C2727}" type="datetime1">
               <a:rPr lang="en-US" smtClean="0"/>
-              <a:t>1/13/22</a:t>
+              <a:t>1/19/2022</a:t>
             </a:fld>
             <a:endParaRPr lang="en-US"/>
           </a:p>
@@ -8479,7 +8479,7 @@
           <a:p>
             <a:fld id="{54D997E8-DDEE-43F1-8D9B-F8A1E11DE488}" type="datetime1">
               <a:rPr lang="en-US" smtClean="0"/>
-              <a:t>1/13/22</a:t>
+              <a:t>1/19/2022</a:t>
             </a:fld>
             <a:endParaRPr lang="en-US"/>
           </a:p>
@@ -8927,7 +8927,7 @@
               <a:rPr lang="en-US" altLang="en-US" sz="3200" dirty="0">
                 <a:sym typeface="Helvetica Neue" charset="0"/>
               </a:rPr>
-              <a:t>CS 4530: Fundamentals of Software Engineering</a:t>
+              <a:t>CS 4350: Fundamentals of Software Engineering</a:t>
             </a:r>
             <a:br>
               <a:rPr lang="en-US" altLang="en-US" sz="3200" dirty="0">
@@ -19922,7 +19922,47 @@
                 <a:effectLst/>
                 <a:latin typeface="Consolas" panose="020B0609020204030204" pitchFamily="49" charset="0"/>
               </a:rPr>
-              <a:t> {</a:t>
+              <a:t> </a:t>
+            </a:r>
+            <a:r>
+              <a:rPr lang="en-US" sz="2000" b="0" dirty="0">
+                <a:solidFill>
+                  <a:srgbClr val="0000FF"/>
+                </a:solidFill>
+                <a:effectLst/>
+                <a:latin typeface="Consolas" panose="020B0609020204030204" pitchFamily="49" charset="0"/>
+              </a:rPr>
+              <a:t>implements</a:t>
+            </a:r>
+            <a:r>
+              <a:rPr lang="en-US" sz="2000" b="0" dirty="0">
+                <a:solidFill>
+                  <a:srgbClr val="000000"/>
+                </a:solidFill>
+                <a:effectLst/>
+                <a:latin typeface="Consolas" panose="020B0609020204030204" pitchFamily="49" charset="0"/>
+              </a:rPr>
+              <a:t> </a:t>
+            </a:r>
+            <a:r>
+              <a:rPr lang="en-US" sz="2000" b="0" dirty="0">
+                <a:solidFill>
+                  <a:srgbClr val="267F99"/>
+                </a:solidFill>
+                <a:effectLst/>
+                <a:latin typeface="Consolas" panose="020B0609020204030204" pitchFamily="49" charset="0"/>
+              </a:rPr>
+              <a:t>Shape </a:t>
+            </a:r>
+            <a:r>
+              <a:rPr lang="en-US" sz="2000" b="0" dirty="0">
+                <a:solidFill>
+                  <a:srgbClr val="000000"/>
+                </a:solidFill>
+                <a:effectLst/>
+                <a:latin typeface="Consolas" panose="020B0609020204030204" pitchFamily="49" charset="0"/>
+              </a:rPr>
+              <a:t>{</a:t>
             </a:r>
           </a:p>
           <a:p>
@@ -20258,7 +20298,47 @@
                 <a:effectLst/>
                 <a:latin typeface="Consolas" panose="020B0609020204030204" pitchFamily="49" charset="0"/>
               </a:rPr>
-              <a:t> {</a:t>
+              <a:t> </a:t>
+            </a:r>
+            <a:r>
+              <a:rPr lang="en-US" sz="2000" b="0" dirty="0">
+                <a:solidFill>
+                  <a:srgbClr val="0000FF"/>
+                </a:solidFill>
+                <a:effectLst/>
+                <a:latin typeface="Consolas" panose="020B0609020204030204" pitchFamily="49" charset="0"/>
+              </a:rPr>
+              <a:t>implements</a:t>
+            </a:r>
+            <a:r>
+              <a:rPr lang="en-US" sz="2000" b="0" dirty="0">
+                <a:solidFill>
+                  <a:srgbClr val="000000"/>
+                </a:solidFill>
+                <a:effectLst/>
+                <a:latin typeface="Consolas" panose="020B0609020204030204" pitchFamily="49" charset="0"/>
+              </a:rPr>
+              <a:t> </a:t>
+            </a:r>
+            <a:r>
+              <a:rPr lang="en-US" sz="2000" b="0" dirty="0">
+                <a:solidFill>
+                  <a:srgbClr val="267F99"/>
+                </a:solidFill>
+                <a:effectLst/>
+                <a:latin typeface="Consolas" panose="020B0609020204030204" pitchFamily="49" charset="0"/>
+              </a:rPr>
+              <a:t>Shape </a:t>
+            </a:r>
+            <a:r>
+              <a:rPr lang="en-US" sz="2000" b="0" dirty="0">
+                <a:solidFill>
+                  <a:srgbClr val="000000"/>
+                </a:solidFill>
+                <a:effectLst/>
+                <a:latin typeface="Consolas" panose="020B0609020204030204" pitchFamily="49" charset="0"/>
+              </a:rPr>
+              <a:t>{</a:t>
             </a:r>
           </a:p>
           <a:p>
@@ -20974,15 +21054,62 @@
               <a:t>ShapeArray</a:t>
             </a:r>
             <a:r>
-              <a:rPr lang="en-US" sz="2000" b="0" dirty="0">
-                <a:solidFill>
-                  <a:srgbClr val="000000"/>
-                </a:solidFill>
-                <a:effectLst/>
-                <a:latin typeface="Consolas" panose="020B0609020204030204" pitchFamily="49" charset="0"/>
-              </a:rPr>
-              <a:t> {</a:t>
-            </a:r>
+              <a:rPr lang="en-US" sz="2000" b="0">
+                <a:solidFill>
+                  <a:srgbClr val="000000"/>
+                </a:solidFill>
+                <a:effectLst/>
+                <a:latin typeface="Consolas" panose="020B0609020204030204" pitchFamily="49" charset="0"/>
+              </a:rPr>
+              <a:t> </a:t>
+            </a:r>
+            <a:r>
+              <a:rPr lang="en-US" sz="2000" b="0">
+                <a:solidFill>
+                  <a:srgbClr val="0000FF"/>
+                </a:solidFill>
+                <a:effectLst/>
+                <a:latin typeface="Consolas" panose="020B0609020204030204" pitchFamily="49" charset="0"/>
+              </a:rPr>
+              <a:t>implements</a:t>
+            </a:r>
+            <a:r>
+              <a:rPr lang="en-US" sz="2000" b="0">
+                <a:solidFill>
+                  <a:srgbClr val="000000"/>
+                </a:solidFill>
+                <a:effectLst/>
+                <a:latin typeface="Consolas" panose="020B0609020204030204" pitchFamily="49" charset="0"/>
+              </a:rPr>
+              <a:t> </a:t>
+            </a:r>
+            <a:r>
+              <a:rPr lang="en-US" sz="2000" b="0">
+                <a:solidFill>
+                  <a:srgbClr val="267F99"/>
+                </a:solidFill>
+                <a:effectLst/>
+                <a:latin typeface="Consolas" panose="020B0609020204030204" pitchFamily="49" charset="0"/>
+              </a:rPr>
+              <a:t>Shape </a:t>
+            </a:r>
+            <a:r>
+              <a:rPr lang="en-US" sz="2000" b="0">
+                <a:solidFill>
+                  <a:srgbClr val="000000"/>
+                </a:solidFill>
+                <a:effectLst/>
+                <a:latin typeface="Consolas" panose="020B0609020204030204" pitchFamily="49" charset="0"/>
+              </a:rPr>
+              <a:t>{</a:t>
+            </a:r>
+            <a:endParaRPr lang="en-US" sz="2000" b="0" dirty="0">
+              <a:solidFill>
+                <a:srgbClr val="000000"/>
+              </a:solidFill>
+              <a:effectLst/>
+              <a:latin typeface="Consolas" panose="020B0609020204030204" pitchFamily="49" charset="0"/>
+            </a:endParaRPr>
           </a:p>
           <a:p>
             <a:r>

</xml_diff>